<commit_message>
adding video demo for Archie
</commit_message>
<xml_diff>
--- a/hackathon_documentation/DTCC-Hackathon-2025-presentation-Archie.pptx
+++ b/hackathon_documentation/DTCC-Hackathon-2025-presentation-Archie.pptx
@@ -141,305 +141,11 @@
 <file path=ppt/revisionInfo.xml><?xml version="1.0" encoding="utf-8"?>
 <p1510:revInfo xmlns:a="http://schemas.openxmlformats.org/drawingml/2006/main" xmlns:r="http://schemas.openxmlformats.org/officeDocument/2006/relationships" xmlns:p1510="http://schemas.microsoft.com/office/powerpoint/2015/10/main">
   <p1510:revLst>
+    <p1510:client id="{50BD15C4-6A39-4E2B-9CBE-5884DA5A9BCC}" v="6" dt="2025-02-06T21:10:53.099"/>
+    <p1510:client id="{73D4BADB-4830-401D-94F2-61CF7EA027F4}" v="66" dt="2025-02-06T20:51:25.267"/>
     <p1510:client id="{9F5D216B-9C51-44E8-8970-703403B9CC69}" v="1" dt="2025-02-06T18:47:13.112"/>
   </p1510:revLst>
 </p1510:revInfo>
-</file>
-
-<file path=ppt/changesInfos/changesInfo1.xml><?xml version="1.0" encoding="utf-8"?>
-<pc:chgInfo xmlns:a="http://schemas.openxmlformats.org/drawingml/2006/main" xmlns:r="http://schemas.openxmlformats.org/officeDocument/2006/relationships" xmlns:ac="http://schemas.microsoft.com/office/drawing/2013/main/command" xmlns:pc="http://schemas.microsoft.com/office/powerpoint/2013/main/command">
-  <pc:docChgLst>
-    <pc:chgData name="Poca, Laura (Contingent Worker)" userId="c5918416-d595-47d3-a4a0-3ea5dcac1a88" providerId="ADAL" clId="{9F5D216B-9C51-44E8-8970-703403B9CC69}"/>
-    <pc:docChg chg="undo custSel addSld delSld modSld sldOrd">
-      <pc:chgData name="Poca, Laura (Contingent Worker)" userId="c5918416-d595-47d3-a4a0-3ea5dcac1a88" providerId="ADAL" clId="{9F5D216B-9C51-44E8-8970-703403B9CC69}" dt="2025-02-06T20:48:36.056" v="5725" actId="2696"/>
-      <pc:docMkLst>
-        <pc:docMk/>
-      </pc:docMkLst>
-      <pc:sldChg chg="modSp add mod ord">
-        <pc:chgData name="Poca, Laura (Contingent Worker)" userId="c5918416-d595-47d3-a4a0-3ea5dcac1a88" providerId="ADAL" clId="{9F5D216B-9C51-44E8-8970-703403B9CC69}" dt="2025-02-06T20:23:25.231" v="5701" actId="20577"/>
-        <pc:sldMkLst>
-          <pc:docMk/>
-          <pc:sldMk cId="1480484846" sldId="256"/>
-        </pc:sldMkLst>
-        <pc:spChg chg="mod">
-          <ac:chgData name="Poca, Laura (Contingent Worker)" userId="c5918416-d595-47d3-a4a0-3ea5dcac1a88" providerId="ADAL" clId="{9F5D216B-9C51-44E8-8970-703403B9CC69}" dt="2025-02-06T20:23:25.231" v="5701" actId="20577"/>
-          <ac:spMkLst>
-            <pc:docMk/>
-            <pc:sldMk cId="1480484846" sldId="256"/>
-            <ac:spMk id="5" creationId="{159466E6-1BE3-C552-70D8-6D857FEEE0BB}"/>
-          </ac:spMkLst>
-        </pc:spChg>
-        <pc:spChg chg="mod">
-          <ac:chgData name="Poca, Laura (Contingent Worker)" userId="c5918416-d595-47d3-a4a0-3ea5dcac1a88" providerId="ADAL" clId="{9F5D216B-9C51-44E8-8970-703403B9CC69}" dt="2025-02-06T18:22:07.091" v="3394" actId="1076"/>
-          <ac:spMkLst>
-            <pc:docMk/>
-            <pc:sldMk cId="1480484846" sldId="256"/>
-            <ac:spMk id="6" creationId="{A20F978C-3131-C3DB-EC4B-DF277497B0DC}"/>
-          </ac:spMkLst>
-        </pc:spChg>
-        <pc:cxnChg chg="mod">
-          <ac:chgData name="Poca, Laura (Contingent Worker)" userId="c5918416-d595-47d3-a4a0-3ea5dcac1a88" providerId="ADAL" clId="{9F5D216B-9C51-44E8-8970-703403B9CC69}" dt="2025-02-06T18:22:02.172" v="3393" actId="1036"/>
-          <ac:cxnSpMkLst>
-            <pc:docMk/>
-            <pc:sldMk cId="1480484846" sldId="256"/>
-            <ac:cxnSpMk id="4" creationId="{3317BEB7-A67F-D179-556A-7FA8B4CD5DD9}"/>
-          </ac:cxnSpMkLst>
-        </pc:cxnChg>
-      </pc:sldChg>
-      <pc:sldChg chg="modSp mod">
-        <pc:chgData name="Poca, Laura (Contingent Worker)" userId="c5918416-d595-47d3-a4a0-3ea5dcac1a88" providerId="ADAL" clId="{9F5D216B-9C51-44E8-8970-703403B9CC69}" dt="2025-02-06T20:21:27.720" v="5587" actId="1076"/>
-        <pc:sldMkLst>
-          <pc:docMk/>
-          <pc:sldMk cId="3603960597" sldId="257"/>
-        </pc:sldMkLst>
-        <pc:spChg chg="mod">
-          <ac:chgData name="Poca, Laura (Contingent Worker)" userId="c5918416-d595-47d3-a4a0-3ea5dcac1a88" providerId="ADAL" clId="{9F5D216B-9C51-44E8-8970-703403B9CC69}" dt="2025-02-06T20:21:27.720" v="5587" actId="1076"/>
-          <ac:spMkLst>
-            <pc:docMk/>
-            <pc:sldMk cId="3603960597" sldId="257"/>
-            <ac:spMk id="2" creationId="{F6B5A277-F0A1-2E15-0DCA-EDFC0F26277E}"/>
-          </ac:spMkLst>
-        </pc:spChg>
-      </pc:sldChg>
-      <pc:sldChg chg="modSp del mod">
-        <pc:chgData name="Poca, Laura (Contingent Worker)" userId="c5918416-d595-47d3-a4a0-3ea5dcac1a88" providerId="ADAL" clId="{9F5D216B-9C51-44E8-8970-703403B9CC69}" dt="2025-02-06T18:22:37.424" v="3400" actId="2696"/>
-        <pc:sldMkLst>
-          <pc:docMk/>
-          <pc:sldMk cId="247678171" sldId="258"/>
-        </pc:sldMkLst>
-        <pc:spChg chg="mod">
-          <ac:chgData name="Poca, Laura (Contingent Worker)" userId="c5918416-d595-47d3-a4a0-3ea5dcac1a88" providerId="ADAL" clId="{9F5D216B-9C51-44E8-8970-703403B9CC69}" dt="2025-02-06T18:21:24.123" v="3376" actId="14100"/>
-          <ac:spMkLst>
-            <pc:docMk/>
-            <pc:sldMk cId="247678171" sldId="258"/>
-            <ac:spMk id="5" creationId="{159466E6-1BE3-C552-70D8-6D857FEEE0BB}"/>
-          </ac:spMkLst>
-        </pc:spChg>
-        <pc:spChg chg="mod">
-          <ac:chgData name="Poca, Laura (Contingent Worker)" userId="c5918416-d595-47d3-a4a0-3ea5dcac1a88" providerId="ADAL" clId="{9F5D216B-9C51-44E8-8970-703403B9CC69}" dt="2025-02-06T18:21:13.179" v="3374" actId="1076"/>
-          <ac:spMkLst>
-            <pc:docMk/>
-            <pc:sldMk cId="247678171" sldId="258"/>
-            <ac:spMk id="6" creationId="{A20F978C-3131-C3DB-EC4B-DF277497B0DC}"/>
-          </ac:spMkLst>
-        </pc:spChg>
-        <pc:cxnChg chg="mod">
-          <ac:chgData name="Poca, Laura (Contingent Worker)" userId="c5918416-d595-47d3-a4a0-3ea5dcac1a88" providerId="ADAL" clId="{9F5D216B-9C51-44E8-8970-703403B9CC69}" dt="2025-02-06T18:21:21.135" v="3375" actId="1076"/>
-          <ac:cxnSpMkLst>
-            <pc:docMk/>
-            <pc:sldMk cId="247678171" sldId="258"/>
-            <ac:cxnSpMk id="4" creationId="{3317BEB7-A67F-D179-556A-7FA8B4CD5DD9}"/>
-          </ac:cxnSpMkLst>
-        </pc:cxnChg>
-      </pc:sldChg>
-      <pc:sldChg chg="modSp add mod">
-        <pc:chgData name="Poca, Laura (Contingent Worker)" userId="c5918416-d595-47d3-a4a0-3ea5dcac1a88" providerId="ADAL" clId="{9F5D216B-9C51-44E8-8970-703403B9CC69}" dt="2025-02-06T20:24:45.179" v="5718" actId="20577"/>
-        <pc:sldMkLst>
-          <pc:docMk/>
-          <pc:sldMk cId="2422818842" sldId="258"/>
-        </pc:sldMkLst>
-        <pc:spChg chg="mod">
-          <ac:chgData name="Poca, Laura (Contingent Worker)" userId="c5918416-d595-47d3-a4a0-3ea5dcac1a88" providerId="ADAL" clId="{9F5D216B-9C51-44E8-8970-703403B9CC69}" dt="2025-02-06T20:24:45.179" v="5718" actId="20577"/>
-          <ac:spMkLst>
-            <pc:docMk/>
-            <pc:sldMk cId="2422818842" sldId="258"/>
-            <ac:spMk id="5" creationId="{159466E6-1BE3-C552-70D8-6D857FEEE0BB}"/>
-          </ac:spMkLst>
-        </pc:spChg>
-      </pc:sldChg>
-      <pc:sldChg chg="addSp delSp modSp mod">
-        <pc:chgData name="Poca, Laura (Contingent Worker)" userId="c5918416-d595-47d3-a4a0-3ea5dcac1a88" providerId="ADAL" clId="{9F5D216B-9C51-44E8-8970-703403B9CC69}" dt="2025-02-06T18:50:45.450" v="4523" actId="20577"/>
-        <pc:sldMkLst>
-          <pc:docMk/>
-          <pc:sldMk cId="2261748986" sldId="259"/>
-        </pc:sldMkLst>
-        <pc:spChg chg="mod">
-          <ac:chgData name="Poca, Laura (Contingent Worker)" userId="c5918416-d595-47d3-a4a0-3ea5dcac1a88" providerId="ADAL" clId="{9F5D216B-9C51-44E8-8970-703403B9CC69}" dt="2025-02-06T18:50:45.450" v="4523" actId="20577"/>
-          <ac:spMkLst>
-            <pc:docMk/>
-            <pc:sldMk cId="2261748986" sldId="259"/>
-            <ac:spMk id="7" creationId="{814EA6B9-DF62-8A33-9911-797831BDFC74}"/>
-          </ac:spMkLst>
-        </pc:spChg>
-        <pc:picChg chg="add del mod">
-          <ac:chgData name="Poca, Laura (Contingent Worker)" userId="c5918416-d595-47d3-a4a0-3ea5dcac1a88" providerId="ADAL" clId="{9F5D216B-9C51-44E8-8970-703403B9CC69}" dt="2025-02-06T18:38:18.985" v="3857" actId="478"/>
-          <ac:picMkLst>
-            <pc:docMk/>
-            <pc:sldMk cId="2261748986" sldId="259"/>
-            <ac:picMk id="3" creationId="{D762AEC4-8355-85E6-3FDF-B4B5A0488B87}"/>
-          </ac:picMkLst>
-        </pc:picChg>
-      </pc:sldChg>
-      <pc:sldChg chg="modSp mod">
-        <pc:chgData name="Poca, Laura (Contingent Worker)" userId="c5918416-d595-47d3-a4a0-3ea5dcac1a88" providerId="ADAL" clId="{9F5D216B-9C51-44E8-8970-703403B9CC69}" dt="2025-02-06T19:31:27.684" v="5585" actId="20577"/>
-        <pc:sldMkLst>
-          <pc:docMk/>
-          <pc:sldMk cId="2678382874" sldId="260"/>
-        </pc:sldMkLst>
-        <pc:spChg chg="mod">
-          <ac:chgData name="Poca, Laura (Contingent Worker)" userId="c5918416-d595-47d3-a4a0-3ea5dcac1a88" providerId="ADAL" clId="{9F5D216B-9C51-44E8-8970-703403B9CC69}" dt="2025-02-06T19:31:27.684" v="5585" actId="20577"/>
-          <ac:spMkLst>
-            <pc:docMk/>
-            <pc:sldMk cId="2678382874" sldId="260"/>
-            <ac:spMk id="2" creationId="{2A35CD4E-7C9E-55F1-5C1B-1A429C7A2BB1}"/>
-          </ac:spMkLst>
-        </pc:spChg>
-      </pc:sldChg>
-      <pc:sldChg chg="del ord">
-        <pc:chgData name="Poca, Laura (Contingent Worker)" userId="c5918416-d595-47d3-a4a0-3ea5dcac1a88" providerId="ADAL" clId="{9F5D216B-9C51-44E8-8970-703403B9CC69}" dt="2025-02-06T20:48:36.056" v="5725" actId="2696"/>
-        <pc:sldMkLst>
-          <pc:docMk/>
-          <pc:sldMk cId="1076723472" sldId="261"/>
-        </pc:sldMkLst>
-      </pc:sldChg>
-      <pc:sldChg chg="modSp add mod">
-        <pc:chgData name="Poca, Laura (Contingent Worker)" userId="c5918416-d595-47d3-a4a0-3ea5dcac1a88" providerId="ADAL" clId="{9F5D216B-9C51-44E8-8970-703403B9CC69}" dt="2025-02-06T19:00:07.123" v="4577" actId="14100"/>
-        <pc:sldMkLst>
-          <pc:docMk/>
-          <pc:sldMk cId="3743900855" sldId="262"/>
-        </pc:sldMkLst>
-        <pc:spChg chg="mod">
-          <ac:chgData name="Poca, Laura (Contingent Worker)" userId="c5918416-d595-47d3-a4a0-3ea5dcac1a88" providerId="ADAL" clId="{9F5D216B-9C51-44E8-8970-703403B9CC69}" dt="2025-02-06T19:00:07.123" v="4577" actId="14100"/>
-          <ac:spMkLst>
-            <pc:docMk/>
-            <pc:sldMk cId="3743900855" sldId="262"/>
-            <ac:spMk id="5" creationId="{5E0E1CBD-AA70-A9F8-9E40-B79AE2FC17B2}"/>
-          </ac:spMkLst>
-        </pc:spChg>
-      </pc:sldChg>
-      <pc:sldChg chg="modSp mod">
-        <pc:chgData name="Poca, Laura (Contingent Worker)" userId="c5918416-d595-47d3-a4a0-3ea5dcac1a88" providerId="ADAL" clId="{9F5D216B-9C51-44E8-8970-703403B9CC69}" dt="2025-02-06T20:21:13.722" v="5586" actId="1076"/>
-        <pc:sldMkLst>
-          <pc:docMk/>
-          <pc:sldMk cId="794632749" sldId="281"/>
-        </pc:sldMkLst>
-        <pc:spChg chg="mod">
-          <ac:chgData name="Poca, Laura (Contingent Worker)" userId="c5918416-d595-47d3-a4a0-3ea5dcac1a88" providerId="ADAL" clId="{9F5D216B-9C51-44E8-8970-703403B9CC69}" dt="2025-02-06T19:29:48.385" v="5516" actId="14100"/>
-          <ac:spMkLst>
-            <pc:docMk/>
-            <pc:sldMk cId="794632749" sldId="281"/>
-            <ac:spMk id="2" creationId="{3C27ED3D-A10D-4D3C-87A4-3CFED9F04BCA}"/>
-          </ac:spMkLst>
-        </pc:spChg>
-        <pc:spChg chg="mod">
-          <ac:chgData name="Poca, Laura (Contingent Worker)" userId="c5918416-d595-47d3-a4a0-3ea5dcac1a88" providerId="ADAL" clId="{9F5D216B-9C51-44E8-8970-703403B9CC69}" dt="2025-02-06T19:30:04.886" v="5529" actId="20577"/>
-          <ac:spMkLst>
-            <pc:docMk/>
-            <pc:sldMk cId="794632749" sldId="281"/>
-            <ac:spMk id="6" creationId="{C81FD80A-71AC-AC2D-E0F2-CE90BDE68A41}"/>
-          </ac:spMkLst>
-        </pc:spChg>
-        <pc:spChg chg="mod">
-          <ac:chgData name="Poca, Laura (Contingent Worker)" userId="c5918416-d595-47d3-a4a0-3ea5dcac1a88" providerId="ADAL" clId="{9F5D216B-9C51-44E8-8970-703403B9CC69}" dt="2025-02-06T20:21:13.722" v="5586" actId="1076"/>
-          <ac:spMkLst>
-            <pc:docMk/>
-            <pc:sldMk cId="794632749" sldId="281"/>
-            <ac:spMk id="19" creationId="{2151889C-3A8B-8187-D544-50E94B2746DA}"/>
-          </ac:spMkLst>
-        </pc:spChg>
-        <pc:spChg chg="mod">
-          <ac:chgData name="Poca, Laura (Contingent Worker)" userId="c5918416-d595-47d3-a4a0-3ea5dcac1a88" providerId="ADAL" clId="{9F5D216B-9C51-44E8-8970-703403B9CC69}" dt="2025-02-06T19:30:30.206" v="5557" actId="20577"/>
-          <ac:spMkLst>
-            <pc:docMk/>
-            <pc:sldMk cId="794632749" sldId="281"/>
-            <ac:spMk id="20" creationId="{52A34CC8-BA14-BDC0-B0BF-77FEF495450D}"/>
-          </ac:spMkLst>
-        </pc:spChg>
-        <pc:spChg chg="mod">
-          <ac:chgData name="Poca, Laura (Contingent Worker)" userId="c5918416-d595-47d3-a4a0-3ea5dcac1a88" providerId="ADAL" clId="{9F5D216B-9C51-44E8-8970-703403B9CC69}" dt="2025-02-06T19:30:38.117" v="5565" actId="20577"/>
-          <ac:spMkLst>
-            <pc:docMk/>
-            <pc:sldMk cId="794632749" sldId="281"/>
-            <ac:spMk id="21" creationId="{73D8322B-C43D-F737-ED90-47A5F045C7FE}"/>
-          </ac:spMkLst>
-        </pc:spChg>
-      </pc:sldChg>
-      <pc:sldChg chg="del">
-        <pc:chgData name="Poca, Laura (Contingent Worker)" userId="c5918416-d595-47d3-a4a0-3ea5dcac1a88" providerId="ADAL" clId="{9F5D216B-9C51-44E8-8970-703403B9CC69}" dt="2025-02-06T19:29:26.345" v="5480" actId="2696"/>
-        <pc:sldMkLst>
-          <pc:docMk/>
-          <pc:sldMk cId="2220611913" sldId="2147483643"/>
-        </pc:sldMkLst>
-      </pc:sldChg>
-      <pc:sldChg chg="modSp mod">
-        <pc:chgData name="Poca, Laura (Contingent Worker)" userId="c5918416-d595-47d3-a4a0-3ea5dcac1a88" providerId="ADAL" clId="{9F5D216B-9C51-44E8-8970-703403B9CC69}" dt="2025-02-06T19:29:01.596" v="5478" actId="20577"/>
-        <pc:sldMkLst>
-          <pc:docMk/>
-          <pc:sldMk cId="3293700664" sldId="2147483644"/>
-        </pc:sldMkLst>
-        <pc:spChg chg="mod">
-          <ac:chgData name="Poca, Laura (Contingent Worker)" userId="c5918416-d595-47d3-a4a0-3ea5dcac1a88" providerId="ADAL" clId="{9F5D216B-9C51-44E8-8970-703403B9CC69}" dt="2025-02-06T19:29:01.596" v="5478" actId="20577"/>
-          <ac:spMkLst>
-            <pc:docMk/>
-            <pc:sldMk cId="3293700664" sldId="2147483644"/>
-            <ac:spMk id="2" creationId="{5B32FE31-D867-3612-6ACE-8420A86F8E50}"/>
-          </ac:spMkLst>
-        </pc:spChg>
-      </pc:sldChg>
-      <pc:sldChg chg="del">
-        <pc:chgData name="Poca, Laura (Contingent Worker)" userId="c5918416-d595-47d3-a4a0-3ea5dcac1a88" providerId="ADAL" clId="{9F5D216B-9C51-44E8-8970-703403B9CC69}" dt="2025-02-06T19:29:18.875" v="5479" actId="2696"/>
-        <pc:sldMkLst>
-          <pc:docMk/>
-          <pc:sldMk cId="3363186646" sldId="2147483645"/>
-        </pc:sldMkLst>
-      </pc:sldChg>
-      <pc:sldChg chg="modSp mod">
-        <pc:chgData name="Poca, Laura (Contingent Worker)" userId="c5918416-d595-47d3-a4a0-3ea5dcac1a88" providerId="ADAL" clId="{9F5D216B-9C51-44E8-8970-703403B9CC69}" dt="2025-02-06T19:31:02.664" v="5582" actId="20577"/>
-        <pc:sldMkLst>
-          <pc:docMk/>
-          <pc:sldMk cId="3958664487" sldId="2147483646"/>
-        </pc:sldMkLst>
-        <pc:spChg chg="mod">
-          <ac:chgData name="Poca, Laura (Contingent Worker)" userId="c5918416-d595-47d3-a4a0-3ea5dcac1a88" providerId="ADAL" clId="{9F5D216B-9C51-44E8-8970-703403B9CC69}" dt="2025-02-06T15:52:08.042" v="38" actId="1076"/>
-          <ac:spMkLst>
-            <pc:docMk/>
-            <pc:sldMk cId="3958664487" sldId="2147483646"/>
-            <ac:spMk id="2" creationId="{D3758354-886C-80C3-778F-BD7C097AA343}"/>
-          </ac:spMkLst>
-        </pc:spChg>
-        <pc:spChg chg="mod">
-          <ac:chgData name="Poca, Laura (Contingent Worker)" userId="c5918416-d595-47d3-a4a0-3ea5dcac1a88" providerId="ADAL" clId="{9F5D216B-9C51-44E8-8970-703403B9CC69}" dt="2025-02-06T19:31:02.664" v="5582" actId="20577"/>
-          <ac:spMkLst>
-            <pc:docMk/>
-            <pc:sldMk cId="3958664487" sldId="2147483646"/>
-            <ac:spMk id="3" creationId="{ECA99E25-846E-304F-26FF-E908E00D4C6C}"/>
-          </ac:spMkLst>
-        </pc:spChg>
-      </pc:sldChg>
-      <pc:sldChg chg="addSp delSp modSp new mod">
-        <pc:chgData name="Poca, Laura (Contingent Worker)" userId="c5918416-d595-47d3-a4a0-3ea5dcac1a88" providerId="ADAL" clId="{9F5D216B-9C51-44E8-8970-703403B9CC69}" dt="2025-02-06T19:00:15.958" v="4582" actId="20577"/>
-        <pc:sldMkLst>
-          <pc:docMk/>
-          <pc:sldMk cId="2108162666" sldId="2147483647"/>
-        </pc:sldMkLst>
-        <pc:spChg chg="add mod">
-          <ac:chgData name="Poca, Laura (Contingent Worker)" userId="c5918416-d595-47d3-a4a0-3ea5dcac1a88" providerId="ADAL" clId="{9F5D216B-9C51-44E8-8970-703403B9CC69}" dt="2025-02-06T19:00:15.958" v="4582" actId="20577"/>
-          <ac:spMkLst>
-            <pc:docMk/>
-            <pc:sldMk cId="2108162666" sldId="2147483647"/>
-            <ac:spMk id="5" creationId="{5E0E1CBD-AA70-A9F8-9E40-B79AE2FC17B2}"/>
-          </ac:spMkLst>
-        </pc:spChg>
-        <pc:picChg chg="add del mod">
-          <ac:chgData name="Poca, Laura (Contingent Worker)" userId="c5918416-d595-47d3-a4a0-3ea5dcac1a88" providerId="ADAL" clId="{9F5D216B-9C51-44E8-8970-703403B9CC69}" dt="2025-02-06T18:59:05.010" v="4528" actId="478"/>
-          <ac:picMkLst>
-            <pc:docMk/>
-            <pc:sldMk cId="2108162666" sldId="2147483647"/>
-            <ac:picMk id="3" creationId="{579CDCD7-326E-F24D-8708-190862996D28}"/>
-          </ac:picMkLst>
-        </pc:picChg>
-        <pc:picChg chg="add mod">
-          <ac:chgData name="Poca, Laura (Contingent Worker)" userId="c5918416-d595-47d3-a4a0-3ea5dcac1a88" providerId="ADAL" clId="{9F5D216B-9C51-44E8-8970-703403B9CC69}" dt="2025-02-06T18:59:30.634" v="4534" actId="14100"/>
-          <ac:picMkLst>
-            <pc:docMk/>
-            <pc:sldMk cId="2108162666" sldId="2147483647"/>
-            <ac:picMk id="7" creationId="{0738F412-5F94-C108-B258-878B77CCE049}"/>
-          </ac:picMkLst>
-        </pc:picChg>
-      </pc:sldChg>
-    </pc:docChg>
-  </pc:docChgLst>
-</pc:chgInfo>
 </file>
 
 <file path=ppt/handoutMasters/handoutMaster1.xml><?xml version="1.0" encoding="utf-8"?>
@@ -10792,7 +10498,7 @@
         </p:nvSpPr>
         <p:spPr>
           <a:xfrm>
-            <a:off x="565553" y="2491018"/>
+            <a:off x="365137" y="2491018"/>
             <a:ext cx="11374656" cy="1755648"/>
           </a:xfrm>
         </p:spPr>
@@ -10802,7 +10508,7 @@
           </a:bodyPr>
           <a:lstStyle/>
           <a:p>
-            <a:pPr marL="192088" indent="-192088">
+            <a:pPr marL="191770" indent="-191770" algn="ctr">
               <a:spcBef>
                 <a:spcPts val="100"/>
               </a:spcBef>
@@ -10811,21 +10517,23 @@
               </a:spcAft>
             </a:pPr>
             <a:r>
-              <a:rPr lang="en-US" sz="6000" dirty="0">
-                <a:solidFill>
-                  <a:schemeClr val="tx1"/>
-                </a:solidFill>
-              </a:rPr>
-              <a:t>Archie – the Architecture Co-Pilot</a:t>
+              <a:rPr lang="en-US" dirty="0"/>
+              <a:t>Archi – The Architect </a:t>
             </a:r>
             <a:br>
-              <a:rPr lang="en-US" sz="6000" dirty="0">
-                <a:solidFill>
-                  <a:schemeClr val="tx1"/>
-                </a:solidFill>
-              </a:rPr>
+              <a:rPr lang="en-US" dirty="0"/>
             </a:br>
-            <a:endParaRPr lang="en-US" dirty="0"/>
+            <a:r>
+              <a:rPr lang="en-US" dirty="0"/>
+              <a:t>and </a:t>
+            </a:r>
+            <a:br>
+              <a:rPr lang="en-US" dirty="0"/>
+            </a:br>
+            <a:r>
+              <a:rPr lang="en-US" dirty="0"/>
+              <a:t>Multipurpose AI Copilot Framework</a:t>
+            </a:r>
           </a:p>
         </p:txBody>
       </p:sp>
@@ -10852,41 +10560,24 @@
           </a:xfrm>
         </p:spPr>
         <p:txBody>
-          <a:bodyPr>
+          <a:bodyPr vert="horz" lIns="91440" tIns="45720" rIns="91440" bIns="45720" rtlCol="0" anchor="t">
             <a:noAutofit/>
           </a:bodyPr>
           <a:lstStyle/>
           <a:p>
             <a:r>
-              <a:rPr lang="en-US" sz="1800" dirty="0">
-                <a:solidFill>
-                  <a:schemeClr val="tx1"/>
-                </a:solidFill>
+              <a:rPr lang="en-US" dirty="0">
+                <a:latin typeface="Arial Narrow"/>
               </a:rPr>
-              <a:t>ITA </a:t>
+              <a:t>IT Architecture</a:t>
             </a:r>
             <a:br>
-              <a:rPr lang="en-US" sz="1800" dirty="0">
-                <a:solidFill>
-                  <a:schemeClr val="tx1"/>
-                </a:solidFill>
-              </a:rPr>
+              <a:rPr lang="en-US" sz="1800" dirty="0"/>
             </a:br>
             <a:r>
-              <a:rPr lang="en-US" sz="1800" dirty="0">
-                <a:solidFill>
-                  <a:schemeClr val="tx1"/>
-                </a:solidFill>
-              </a:rPr>
-              <a:t>DTCC ITA</a:t>
-            </a:r>
-            <a:br>
-              <a:rPr lang="en-US" sz="1800" dirty="0">
-                <a:solidFill>
-                  <a:schemeClr val="tx1"/>
-                </a:solidFill>
-              </a:rPr>
-            </a:br>
+              <a:rPr lang="en-US" sz="1800" dirty="0"/>
+              <a:t>DTCC</a:t>
+            </a:r>
             <a:endParaRPr lang="en-US" dirty="0"/>
           </a:p>
         </p:txBody>
@@ -10907,8 +10598,8 @@
         </p:nvSpPr>
         <p:spPr>
           <a:xfrm>
-            <a:off x="1295460" y="5560548"/>
-            <a:ext cx="1625429" cy="185730"/>
+            <a:off x="1295460" y="5535495"/>
+            <a:ext cx="3664847" cy="224887"/>
           </a:xfrm>
           <a:prstGeom prst="rect">
             <a:avLst/>
@@ -11105,7 +10796,15 @@
           <a:p>
             <a:r>
               <a:rPr lang="en-US" sz="1000" dirty="0"/>
-              <a:t>Laura Monica Poca</a:t>
+              <a:t>Laura Monica Poca, Allan </a:t>
+            </a:r>
+            <a:r>
+              <a:rPr lang="en-US" sz="1000" dirty="0" err="1"/>
+              <a:t>Valloran</a:t>
+            </a:r>
+            <a:r>
+              <a:rPr lang="en-US" sz="1000" dirty="0"/>
+              <a:t>, Sundeep Mohanty</a:t>
             </a:r>
           </a:p>
         </p:txBody>
@@ -15131,13 +14830,13 @@
           <a:p>
             <a:r>
               <a:rPr lang="en-US" sz="4000" dirty="0"/>
-              <a:t>Archie – Architecture Copilot Solution</a:t>
+              <a:t>Archi – Architecture Copilot Solution</a:t>
             </a:r>
           </a:p>
           <a:p>
             <a:r>
               <a:rPr lang="en-US" sz="4000" dirty="0"/>
-              <a:t>Archie – Video Demo</a:t>
+              <a:t>Archi – Video Demo</a:t>
             </a:r>
           </a:p>
         </p:txBody>
@@ -15434,6 +15133,12 @@
               <a:rPr lang="en-US" dirty="0"/>
               <a:t>Compliance audits are complex and require answers from several architecture artifacts</a:t>
             </a:r>
+          </a:p>
+          <a:p>
+            <a:pPr marL="0" indent="0">
+              <a:buNone/>
+            </a:pPr>
+            <a:endParaRPr lang="en-US" dirty="0"/>
           </a:p>
           <a:p>
             <a:endParaRPr lang="en-US" dirty="0"/>
@@ -15845,7 +15550,14 @@
             <a:pPr lvl="1"/>
             <a:r>
               <a:rPr lang="en-US" dirty="0"/>
-              <a:t>Archie, the Architecture Co-Pilot application, enables Architecture Teams to onboard all relevant Architecture documents and allow different personas within the organization to leverage their content, to be able to search for ITA specific information, diagrams, key concepts and ask questions in real time to get insights into different areas of Architecture. </a:t>
+              <a:t>Create an AI copilot framework that can be leveraged for solving Architectural engagement concerns also to define an open AI copilot framework that can be used for various other use cases.</a:t>
+            </a:r>
+          </a:p>
+          <a:p>
+            <a:pPr lvl="1"/>
+            <a:r>
+              <a:rPr lang="en-US" dirty="0"/>
+              <a:t>Archi, the Architecture Co-Pilot application, enables Architecture Teams to onboard all relevant Architecture documents and allow different personas within the organization to leverage their content, to be able to search for ITA specific information, diagrams, key concepts and ask questions in real time to get insights into different areas of Architecture. </a:t>
             </a:r>
           </a:p>
           <a:p>
@@ -15893,12 +15605,12 @@
                 <a:spcPts val="100"/>
               </a:spcAft>
             </a:pPr>
-            <a:r>
-              <a:rPr lang="en-US" dirty="0"/>
-              <a:t>The solution is targeted for Architecture, but it is generic and can be leveraged for multiple areas</a:t>
-            </a:r>
-          </a:p>
-          <a:p>
+            <a:endParaRPr lang="en-US" dirty="0"/>
+          </a:p>
+          <a:p>
+            <a:pPr marL="0" indent="0">
+              <a:buNone/>
+            </a:pPr>
             <a:endParaRPr lang="en-US" dirty="0"/>
           </a:p>
         </p:txBody>
@@ -16505,6 +16217,20 @@
             <a:r>
               <a:rPr lang="en-US" dirty="0"/>
               <a:t>Enable AI-Powered Risk Assessments</a:t>
+            </a:r>
+          </a:p>
+          <a:p>
+            <a:pPr marL="700088" lvl="1" indent="-192088">
+              <a:spcBef>
+                <a:spcPts val="100"/>
+              </a:spcBef>
+              <a:spcAft>
+                <a:spcPts val="100"/>
+              </a:spcAft>
+            </a:pPr>
+            <a:r>
+              <a:rPr lang="en-US" dirty="0"/>
+              <a:t>Plug and Play AI framework for productivity gain </a:t>
             </a:r>
           </a:p>
           <a:p>
@@ -18645,15 +18371,6 @@
 </file>
 
 <file path=customXml/item1.xml><?xml version="1.0" encoding="utf-8"?>
-<?mso-contentType ?>
-<FormTemplates xmlns="http://schemas.microsoft.com/sharepoint/v3/contenttype/forms">
-  <Display>DocumentLibraryForm</Display>
-  <Edit>DocumentLibraryForm</Edit>
-  <New>DocumentLibraryForm</New>
-</FormTemplates>
-</file>
-
-<file path=customXml/item2.xml><?xml version="1.0" encoding="utf-8"?>
 <ct:contentTypeSchema xmlns:ct="http://schemas.microsoft.com/office/2006/metadata/contentType" xmlns:ma="http://schemas.microsoft.com/office/2006/metadata/properties/metaAttributes" ct:_="" ma:_="" ma:contentTypeName="Document" ma:contentTypeID="0x010100C511F91C0216FC43B39B2D1788EB71F2" ma:contentTypeVersion="17" ma:contentTypeDescription="Create a new document." ma:contentTypeScope="" ma:versionID="89d5374596b3f17b559a695e48028790">
   <xsd:schema xmlns:xsd="http://www.w3.org/2001/XMLSchema" xmlns:xs="http://www.w3.org/2001/XMLSchema" xmlns:p="http://schemas.microsoft.com/office/2006/metadata/properties" xmlns:ns2="1065a63a-d1fb-4e7c-b49a-75e3b7913b1b" xmlns:ns3="4a284ed9-66f8-4526-8ffe-a759eb7a5148" targetNamespace="http://schemas.microsoft.com/office/2006/metadata/properties" ma:root="true" ma:fieldsID="7fd180370dd7b60f421aec0680370c04" ns2:_="" ns3:_="">
     <xsd:import namespace="1065a63a-d1fb-4e7c-b49a-75e3b7913b1b"/>
@@ -18902,6 +18619,15 @@
 </ct:contentTypeSchema>
 </file>
 
+<file path=customXml/item2.xml><?xml version="1.0" encoding="utf-8"?>
+<?mso-contentType ?>
+<FormTemplates xmlns="http://schemas.microsoft.com/sharepoint/v3/contenttype/forms">
+  <Display>DocumentLibraryForm</Display>
+  <Edit>DocumentLibraryForm</Edit>
+  <New>DocumentLibraryForm</New>
+</FormTemplates>
+</file>
+
 <file path=customXml/item3.xml><?xml version="1.0" encoding="utf-8"?>
 <p:properties xmlns:p="http://schemas.microsoft.com/office/2006/metadata/properties" xmlns:xsi="http://www.w3.org/2001/XMLSchema-instance" xmlns:pc="http://schemas.microsoft.com/office/infopath/2007/PartnerControls">
   <documentManagement>
@@ -18914,14 +18640,6 @@
 </file>
 
 <file path=customXml/itemProps1.xml><?xml version="1.0" encoding="utf-8"?>
-<ds:datastoreItem xmlns:ds="http://schemas.openxmlformats.org/officeDocument/2006/customXml" ds:itemID="{4671692A-3EFE-48B4-AC97-E6DDEACD88F0}">
-  <ds:schemaRefs>
-    <ds:schemaRef ds:uri="http://schemas.microsoft.com/sharepoint/v3/contenttype/forms"/>
-  </ds:schemaRefs>
-</ds:datastoreItem>
-</file>
-
-<file path=customXml/itemProps2.xml><?xml version="1.0" encoding="utf-8"?>
 <ds:datastoreItem xmlns:ds="http://schemas.openxmlformats.org/officeDocument/2006/customXml" ds:itemID="{98A69A05-8B48-4522-B0A8-0E1853F4B294}">
   <ds:schemaRefs>
     <ds:schemaRef ds:uri="1065a63a-d1fb-4e7c-b49a-75e3b7913b1b"/>
@@ -18940,19 +18658,27 @@
 </ds:datastoreItem>
 </file>
 
+<file path=customXml/itemProps2.xml><?xml version="1.0" encoding="utf-8"?>
+<ds:datastoreItem xmlns:ds="http://schemas.openxmlformats.org/officeDocument/2006/customXml" ds:itemID="{4671692A-3EFE-48B4-AC97-E6DDEACD88F0}">
+  <ds:schemaRefs>
+    <ds:schemaRef ds:uri="http://schemas.microsoft.com/sharepoint/v3/contenttype/forms"/>
+  </ds:schemaRefs>
+</ds:datastoreItem>
+</file>
+
 <file path=customXml/itemProps3.xml><?xml version="1.0" encoding="utf-8"?>
 <ds:datastoreItem xmlns:ds="http://schemas.openxmlformats.org/officeDocument/2006/customXml" ds:itemID="{F43BF5B5-40F2-4997-8968-A7C02944E0E9}">
   <ds:schemaRefs>
-    <ds:schemaRef ds:uri="1065a63a-d1fb-4e7c-b49a-75e3b7913b1b"/>
+    <ds:schemaRef ds:uri="http://purl.org/dc/elements/1.1/"/>
+    <ds:schemaRef ds:uri="http://schemas.microsoft.com/office/2006/metadata/properties"/>
+    <ds:schemaRef ds:uri="http://schemas.microsoft.com/office/infopath/2007/PartnerControls"/>
     <ds:schemaRef ds:uri="4a284ed9-66f8-4526-8ffe-a759eb7a5148"/>
-    <ds:schemaRef ds:uri="http://purl.org/dc/dcmitype/"/>
-    <ds:schemaRef ds:uri="http://purl.org/dc/elements/1.1/"/>
     <ds:schemaRef ds:uri="http://purl.org/dc/terms/"/>
     <ds:schemaRef ds:uri="http://schemas.microsoft.com/office/2006/documentManagement/types"/>
-    <ds:schemaRef ds:uri="http://schemas.microsoft.com/office/2006/metadata/properties"/>
-    <ds:schemaRef ds:uri="http://schemas.microsoft.com/office/infopath/2007/PartnerControls"/>
     <ds:schemaRef ds:uri="http://schemas.openxmlformats.org/package/2006/metadata/core-properties"/>
+    <ds:schemaRef ds:uri="1065a63a-d1fb-4e7c-b49a-75e3b7913b1b"/>
     <ds:schemaRef ds:uri="http://www.w3.org/XML/1998/namespace"/>
+    <ds:schemaRef ds:uri="http://purl.org/dc/dcmitype/"/>
   </ds:schemaRefs>
 </ds:datastoreItem>
 </file>
</xml_diff>

<commit_message>
add change to ppt
</commit_message>
<xml_diff>
--- a/hackathon_documentation/DTCC-Hackathon-2025-presentation-Archie.pptx
+++ b/hackathon_documentation/DTCC-Hackathon-2025-presentation-Archie.pptx
@@ -146,6 +146,50 @@
     <p1510:client id="{9F5D216B-9C51-44E8-8970-703403B9CC69}" v="1" dt="2025-02-06T18:47:13.112"/>
   </p1510:revLst>
 </p1510:revInfo>
+</file>
+
+<file path=ppt/changesInfos/changesInfo1.xml><?xml version="1.0" encoding="utf-8"?>
+<pc:chgInfo xmlns:a="http://schemas.openxmlformats.org/drawingml/2006/main" xmlns:r="http://schemas.openxmlformats.org/officeDocument/2006/relationships" xmlns:ac="http://schemas.microsoft.com/office/drawing/2013/main/command" xmlns:pc="http://schemas.microsoft.com/office/powerpoint/2013/main/command">
+  <pc:docChgLst>
+    <pc:chgData name="Poca, Laura (Contingent Worker)" userId="c5918416-d595-47d3-a4a0-3ea5dcac1a88" providerId="ADAL" clId="{21D08CD1-E87B-4BF1-89AE-E5B2065605CC}"/>
+    <pc:docChg chg="undo custSel modSld">
+      <pc:chgData name="Poca, Laura (Contingent Worker)" userId="c5918416-d595-47d3-a4a0-3ea5dcac1a88" providerId="ADAL" clId="{21D08CD1-E87B-4BF1-89AE-E5B2065605CC}" dt="2025-02-06T21:39:59.706" v="4" actId="20577"/>
+      <pc:docMkLst>
+        <pc:docMk/>
+      </pc:docMkLst>
+      <pc:sldChg chg="modSp mod">
+        <pc:chgData name="Poca, Laura (Contingent Worker)" userId="c5918416-d595-47d3-a4a0-3ea5dcac1a88" providerId="ADAL" clId="{21D08CD1-E87B-4BF1-89AE-E5B2065605CC}" dt="2025-02-06T21:37:20.924" v="1" actId="20577"/>
+        <pc:sldMkLst>
+          <pc:docMk/>
+          <pc:sldMk cId="3603960597" sldId="257"/>
+        </pc:sldMkLst>
+        <pc:spChg chg="mod">
+          <ac:chgData name="Poca, Laura (Contingent Worker)" userId="c5918416-d595-47d3-a4a0-3ea5dcac1a88" providerId="ADAL" clId="{21D08CD1-E87B-4BF1-89AE-E5B2065605CC}" dt="2025-02-06T21:37:20.924" v="1" actId="20577"/>
+          <ac:spMkLst>
+            <pc:docMk/>
+            <pc:sldMk cId="3603960597" sldId="257"/>
+            <ac:spMk id="2" creationId="{F6B5A277-F0A1-2E15-0DCA-EDFC0F26277E}"/>
+          </ac:spMkLst>
+        </pc:spChg>
+      </pc:sldChg>
+      <pc:sldChg chg="modSp mod">
+        <pc:chgData name="Poca, Laura (Contingent Worker)" userId="c5918416-d595-47d3-a4a0-3ea5dcac1a88" providerId="ADAL" clId="{21D08CD1-E87B-4BF1-89AE-E5B2065605CC}" dt="2025-02-06T21:39:59.706" v="4" actId="20577"/>
+        <pc:sldMkLst>
+          <pc:docMk/>
+          <pc:sldMk cId="2422818842" sldId="258"/>
+        </pc:sldMkLst>
+        <pc:spChg chg="mod">
+          <ac:chgData name="Poca, Laura (Contingent Worker)" userId="c5918416-d595-47d3-a4a0-3ea5dcac1a88" providerId="ADAL" clId="{21D08CD1-E87B-4BF1-89AE-E5B2065605CC}" dt="2025-02-06T21:39:59.706" v="4" actId="20577"/>
+          <ac:spMkLst>
+            <pc:docMk/>
+            <pc:sldMk cId="2422818842" sldId="258"/>
+            <ac:spMk id="5" creationId="{159466E6-1BE3-C552-70D8-6D857FEEE0BB}"/>
+          </ac:spMkLst>
+        </pc:spChg>
+      </pc:sldChg>
+    </pc:docChg>
+  </pc:docChgLst>
+</pc:chgInfo>
 </file>
 
 <file path=ppt/handoutMasters/handoutMaster1.xml><?xml version="1.0" encoding="utf-8"?>
@@ -15122,22 +15166,12 @@
             </a:pPr>
             <a:r>
               <a:rPr lang="en-US" dirty="0"/>
-              <a:t>Unification, standardization and modernization of architecture artifacts is time consuming and requires domain specific and technology specific information</a:t>
-            </a:r>
-          </a:p>
-          <a:p>
-            <a:pPr marL="0" indent="0">
-              <a:buNone/>
-            </a:pPr>
-            <a:r>
-              <a:rPr lang="en-US" dirty="0"/>
-              <a:t>Compliance audits are complex and require answers from several architecture artifacts</a:t>
-            </a:r>
-          </a:p>
-          <a:p>
-            <a:pPr marL="0" indent="0">
-              <a:buNone/>
-            </a:pPr>
+              <a:t>Unification, standardization and modernization of architecture artifacts is time consuming and requires domain specific and technology </a:t>
+            </a:r>
+            <a:r>
+              <a:rPr lang="en-US"/>
+              <a:t>specific information</a:t>
+            </a:r>
             <a:endParaRPr lang="en-US" dirty="0"/>
           </a:p>
           <a:p>
@@ -16173,22 +16207,12 @@
               </a:spcAft>
             </a:pPr>
             <a:r>
+              <a:rPr lang="en-US"/>
+              <a:t>Monitoring </a:t>
+            </a:r>
+            <a:r>
               <a:rPr lang="en-US" dirty="0"/>
-              <a:t>Empower regulatory compliance by design </a:t>
-            </a:r>
-          </a:p>
-          <a:p>
-            <a:pPr marL="700088" lvl="1" indent="-192088">
-              <a:spcBef>
-                <a:spcPts val="100"/>
-              </a:spcBef>
-              <a:spcAft>
-                <a:spcPts val="100"/>
-              </a:spcAft>
-            </a:pPr>
-            <a:r>
-              <a:rPr lang="en-US" dirty="0"/>
-              <a:t>Monitoring governance compliance</a:t>
+              <a:t>governance compliance</a:t>
             </a:r>
           </a:p>
           <a:p>
@@ -18371,6 +18395,17 @@
 </file>
 
 <file path=customXml/item1.xml><?xml version="1.0" encoding="utf-8"?>
+<p:properties xmlns:p="http://schemas.microsoft.com/office/2006/metadata/properties" xmlns:xsi="http://www.w3.org/2001/XMLSchema-instance" xmlns:pc="http://schemas.microsoft.com/office/infopath/2007/PartnerControls">
+  <documentManagement>
+    <TaxCatchAll xmlns="4a284ed9-66f8-4526-8ffe-a759eb7a5148"/>
+    <lcf76f155ced4ddcb4097134ff3c332f xmlns="1065a63a-d1fb-4e7c-b49a-75e3b7913b1b">
+      <Terms xmlns="http://schemas.microsoft.com/office/infopath/2007/PartnerControls"/>
+    </lcf76f155ced4ddcb4097134ff3c332f>
+  </documentManagement>
+</p:properties>
+</file>
+
+<file path=customXml/item2.xml><?xml version="1.0" encoding="utf-8"?>
 <ct:contentTypeSchema xmlns:ct="http://schemas.microsoft.com/office/2006/metadata/contentType" xmlns:ma="http://schemas.microsoft.com/office/2006/metadata/properties/metaAttributes" ct:_="" ma:_="" ma:contentTypeName="Document" ma:contentTypeID="0x010100C511F91C0216FC43B39B2D1788EB71F2" ma:contentTypeVersion="17" ma:contentTypeDescription="Create a new document." ma:contentTypeScope="" ma:versionID="89d5374596b3f17b559a695e48028790">
   <xsd:schema xmlns:xsd="http://www.w3.org/2001/XMLSchema" xmlns:xs="http://www.w3.org/2001/XMLSchema" xmlns:p="http://schemas.microsoft.com/office/2006/metadata/properties" xmlns:ns2="1065a63a-d1fb-4e7c-b49a-75e3b7913b1b" xmlns:ns3="4a284ed9-66f8-4526-8ffe-a759eb7a5148" targetNamespace="http://schemas.microsoft.com/office/2006/metadata/properties" ma:root="true" ma:fieldsID="7fd180370dd7b60f421aec0680370c04" ns2:_="" ns3:_="">
     <xsd:import namespace="1065a63a-d1fb-4e7c-b49a-75e3b7913b1b"/>
@@ -18619,7 +18654,7 @@
 </ct:contentTypeSchema>
 </file>
 
-<file path=customXml/item2.xml><?xml version="1.0" encoding="utf-8"?>
+<file path=customXml/item3.xml><?xml version="1.0" encoding="utf-8"?>
 <?mso-contentType ?>
 <FormTemplates xmlns="http://schemas.microsoft.com/sharepoint/v3/contenttype/forms">
   <Display>DocumentLibraryForm</Display>
@@ -18628,18 +18663,24 @@
 </FormTemplates>
 </file>
 
-<file path=customXml/item3.xml><?xml version="1.0" encoding="utf-8"?>
-<p:properties xmlns:p="http://schemas.microsoft.com/office/2006/metadata/properties" xmlns:xsi="http://www.w3.org/2001/XMLSchema-instance" xmlns:pc="http://schemas.microsoft.com/office/infopath/2007/PartnerControls">
-  <documentManagement>
-    <TaxCatchAll xmlns="4a284ed9-66f8-4526-8ffe-a759eb7a5148"/>
-    <lcf76f155ced4ddcb4097134ff3c332f xmlns="1065a63a-d1fb-4e7c-b49a-75e3b7913b1b">
-      <Terms xmlns="http://schemas.microsoft.com/office/infopath/2007/PartnerControls"/>
-    </lcf76f155ced4ddcb4097134ff3c332f>
-  </documentManagement>
-</p:properties>
+<file path=customXml/itemProps1.xml><?xml version="1.0" encoding="utf-8"?>
+<ds:datastoreItem xmlns:ds="http://schemas.openxmlformats.org/officeDocument/2006/customXml" ds:itemID="{F43BF5B5-40F2-4997-8968-A7C02944E0E9}">
+  <ds:schemaRefs>
+    <ds:schemaRef ds:uri="http://purl.org/dc/elements/1.1/"/>
+    <ds:schemaRef ds:uri="http://schemas.microsoft.com/office/2006/metadata/properties"/>
+    <ds:schemaRef ds:uri="http://schemas.microsoft.com/office/infopath/2007/PartnerControls"/>
+    <ds:schemaRef ds:uri="4a284ed9-66f8-4526-8ffe-a759eb7a5148"/>
+    <ds:schemaRef ds:uri="http://purl.org/dc/terms/"/>
+    <ds:schemaRef ds:uri="http://schemas.microsoft.com/office/2006/documentManagement/types"/>
+    <ds:schemaRef ds:uri="http://schemas.openxmlformats.org/package/2006/metadata/core-properties"/>
+    <ds:schemaRef ds:uri="1065a63a-d1fb-4e7c-b49a-75e3b7913b1b"/>
+    <ds:schemaRef ds:uri="http://www.w3.org/XML/1998/namespace"/>
+    <ds:schemaRef ds:uri="http://purl.org/dc/dcmitype/"/>
+  </ds:schemaRefs>
+</ds:datastoreItem>
 </file>
 
-<file path=customXml/itemProps1.xml><?xml version="1.0" encoding="utf-8"?>
+<file path=customXml/itemProps2.xml><?xml version="1.0" encoding="utf-8"?>
 <ds:datastoreItem xmlns:ds="http://schemas.openxmlformats.org/officeDocument/2006/customXml" ds:itemID="{98A69A05-8B48-4522-B0A8-0E1853F4B294}">
   <ds:schemaRefs>
     <ds:schemaRef ds:uri="1065a63a-d1fb-4e7c-b49a-75e3b7913b1b"/>
@@ -18658,27 +18699,10 @@
 </ds:datastoreItem>
 </file>
 
-<file path=customXml/itemProps2.xml><?xml version="1.0" encoding="utf-8"?>
+<file path=customXml/itemProps3.xml><?xml version="1.0" encoding="utf-8"?>
 <ds:datastoreItem xmlns:ds="http://schemas.openxmlformats.org/officeDocument/2006/customXml" ds:itemID="{4671692A-3EFE-48B4-AC97-E6DDEACD88F0}">
   <ds:schemaRefs>
     <ds:schemaRef ds:uri="http://schemas.microsoft.com/sharepoint/v3/contenttype/forms"/>
   </ds:schemaRefs>
 </ds:datastoreItem>
-</file>
-
-<file path=customXml/itemProps3.xml><?xml version="1.0" encoding="utf-8"?>
-<ds:datastoreItem xmlns:ds="http://schemas.openxmlformats.org/officeDocument/2006/customXml" ds:itemID="{F43BF5B5-40F2-4997-8968-A7C02944E0E9}">
-  <ds:schemaRefs>
-    <ds:schemaRef ds:uri="http://purl.org/dc/elements/1.1/"/>
-    <ds:schemaRef ds:uri="http://schemas.microsoft.com/office/2006/metadata/properties"/>
-    <ds:schemaRef ds:uri="http://schemas.microsoft.com/office/infopath/2007/PartnerControls"/>
-    <ds:schemaRef ds:uri="4a284ed9-66f8-4526-8ffe-a759eb7a5148"/>
-    <ds:schemaRef ds:uri="http://purl.org/dc/terms/"/>
-    <ds:schemaRef ds:uri="http://schemas.microsoft.com/office/2006/documentManagement/types"/>
-    <ds:schemaRef ds:uri="http://schemas.openxmlformats.org/package/2006/metadata/core-properties"/>
-    <ds:schemaRef ds:uri="1065a63a-d1fb-4e7c-b49a-75e3b7913b1b"/>
-    <ds:schemaRef ds:uri="http://www.w3.org/XML/1998/namespace"/>
-    <ds:schemaRef ds:uri="http://purl.org/dc/dcmitype/"/>
-  </ds:schemaRefs>
-</ds:datastoreItem>
 </file>
</xml_diff>